<commit_message>
Update TRB-ImpactAttenuationSystem-Poster - BDS_v2.pptx
</commit_message>
<xml_diff>
--- a/files/SAE/TRB-ImpactAttenuationSystem-Poster - BDS_v2.pptx
+++ b/files/SAE/TRB-ImpactAttenuationSystem-Poster - BDS_v2.pptx
@@ -166,7 +166,7 @@
           </a:lstStyle>
           <a:p>
             <a:r>
-              <a:rPr lang="en-US" smtClean="0"/>
+              <a:rPr lang="en-US"/>
               <a:t>Click to edit Master title style</a:t>
             </a:r>
             <a:endParaRPr lang="en-US" dirty="0"/>
@@ -231,7 +231,7 @@
           </a:lstStyle>
           <a:p>
             <a:r>
-              <a:rPr lang="en-US" smtClean="0"/>
+              <a:rPr lang="en-US"/>
               <a:t>Click to edit Master subtitle style</a:t>
             </a:r>
             <a:endParaRPr lang="en-US" dirty="0"/>
@@ -255,7 +255,7 @@
           <a:p>
             <a:fld id="{563E111F-98C8-4E70-A91E-7E1DDAA7F2CF}" type="datetimeFigureOut">
               <a:rPr lang="en-US" smtClean="0"/>
-              <a:t>12/18/2019</a:t>
+              <a:t>12/19/2019</a:t>
             </a:fld>
             <a:endParaRPr lang="en-US" dirty="0"/>
           </a:p>
@@ -349,7 +349,7 @@
           <a:lstStyle/>
           <a:p>
             <a:r>
-              <a:rPr lang="en-US" smtClean="0"/>
+              <a:rPr lang="en-US"/>
               <a:t>Click to edit Master title style</a:t>
             </a:r>
             <a:endParaRPr lang="en-US" dirty="0"/>
@@ -373,35 +373,35 @@
           <a:p>
             <a:pPr lvl="0"/>
             <a:r>
-              <a:rPr lang="en-US" smtClean="0"/>
+              <a:rPr lang="en-US"/>
               <a:t>Edit Master text styles</a:t>
             </a:r>
           </a:p>
           <a:p>
             <a:pPr lvl="1"/>
             <a:r>
-              <a:rPr lang="en-US" smtClean="0"/>
+              <a:rPr lang="en-US"/>
               <a:t>Second level</a:t>
             </a:r>
           </a:p>
           <a:p>
             <a:pPr lvl="2"/>
             <a:r>
-              <a:rPr lang="en-US" smtClean="0"/>
+              <a:rPr lang="en-US"/>
               <a:t>Third level</a:t>
             </a:r>
           </a:p>
           <a:p>
             <a:pPr lvl="3"/>
             <a:r>
-              <a:rPr lang="en-US" smtClean="0"/>
+              <a:rPr lang="en-US"/>
               <a:t>Fourth level</a:t>
             </a:r>
           </a:p>
           <a:p>
             <a:pPr lvl="4"/>
             <a:r>
-              <a:rPr lang="en-US" smtClean="0"/>
+              <a:rPr lang="en-US"/>
               <a:t>Fifth level</a:t>
             </a:r>
             <a:endParaRPr lang="en-US" dirty="0"/>
@@ -425,7 +425,7 @@
           <a:p>
             <a:fld id="{563E111F-98C8-4E70-A91E-7E1DDAA7F2CF}" type="datetimeFigureOut">
               <a:rPr lang="en-US" smtClean="0"/>
-              <a:t>12/18/2019</a:t>
+              <a:t>12/19/2019</a:t>
             </a:fld>
             <a:endParaRPr lang="en-US" dirty="0"/>
           </a:p>
@@ -524,7 +524,7 @@
           <a:lstStyle/>
           <a:p>
             <a:r>
-              <a:rPr lang="en-US" smtClean="0"/>
+              <a:rPr lang="en-US"/>
               <a:t>Click to edit Master title style</a:t>
             </a:r>
             <a:endParaRPr lang="en-US" dirty="0"/>
@@ -553,35 +553,35 @@
           <a:p>
             <a:pPr lvl="0"/>
             <a:r>
-              <a:rPr lang="en-US" smtClean="0"/>
+              <a:rPr lang="en-US"/>
               <a:t>Edit Master text styles</a:t>
             </a:r>
           </a:p>
           <a:p>
             <a:pPr lvl="1"/>
             <a:r>
-              <a:rPr lang="en-US" smtClean="0"/>
+              <a:rPr lang="en-US"/>
               <a:t>Second level</a:t>
             </a:r>
           </a:p>
           <a:p>
             <a:pPr lvl="2"/>
             <a:r>
-              <a:rPr lang="en-US" smtClean="0"/>
+              <a:rPr lang="en-US"/>
               <a:t>Third level</a:t>
             </a:r>
           </a:p>
           <a:p>
             <a:pPr lvl="3"/>
             <a:r>
-              <a:rPr lang="en-US" smtClean="0"/>
+              <a:rPr lang="en-US"/>
               <a:t>Fourth level</a:t>
             </a:r>
           </a:p>
           <a:p>
             <a:pPr lvl="4"/>
             <a:r>
-              <a:rPr lang="en-US" smtClean="0"/>
+              <a:rPr lang="en-US"/>
               <a:t>Fifth level</a:t>
             </a:r>
             <a:endParaRPr lang="en-US" dirty="0"/>
@@ -605,7 +605,7 @@
           <a:p>
             <a:fld id="{563E111F-98C8-4E70-A91E-7E1DDAA7F2CF}" type="datetimeFigureOut">
               <a:rPr lang="en-US" smtClean="0"/>
-              <a:t>12/18/2019</a:t>
+              <a:t>12/19/2019</a:t>
             </a:fld>
             <a:endParaRPr lang="en-US" dirty="0"/>
           </a:p>
@@ -699,7 +699,7 @@
           <a:lstStyle/>
           <a:p>
             <a:r>
-              <a:rPr lang="en-US" smtClean="0"/>
+              <a:rPr lang="en-US"/>
               <a:t>Click to edit Master title style</a:t>
             </a:r>
             <a:endParaRPr lang="en-US" dirty="0"/>
@@ -723,35 +723,35 @@
           <a:p>
             <a:pPr lvl="0"/>
             <a:r>
-              <a:rPr lang="en-US" smtClean="0"/>
+              <a:rPr lang="en-US"/>
               <a:t>Edit Master text styles</a:t>
             </a:r>
           </a:p>
           <a:p>
             <a:pPr lvl="1"/>
             <a:r>
-              <a:rPr lang="en-US" smtClean="0"/>
+              <a:rPr lang="en-US"/>
               <a:t>Second level</a:t>
             </a:r>
           </a:p>
           <a:p>
             <a:pPr lvl="2"/>
             <a:r>
-              <a:rPr lang="en-US" smtClean="0"/>
+              <a:rPr lang="en-US"/>
               <a:t>Third level</a:t>
             </a:r>
           </a:p>
           <a:p>
             <a:pPr lvl="3"/>
             <a:r>
-              <a:rPr lang="en-US" smtClean="0"/>
+              <a:rPr lang="en-US"/>
               <a:t>Fourth level</a:t>
             </a:r>
           </a:p>
           <a:p>
             <a:pPr lvl="4"/>
             <a:r>
-              <a:rPr lang="en-US" smtClean="0"/>
+              <a:rPr lang="en-US"/>
               <a:t>Fifth level</a:t>
             </a:r>
             <a:endParaRPr lang="en-US" dirty="0"/>
@@ -775,7 +775,7 @@
           <a:p>
             <a:fld id="{563E111F-98C8-4E70-A91E-7E1DDAA7F2CF}" type="datetimeFigureOut">
               <a:rPr lang="en-US" smtClean="0"/>
-              <a:t>12/18/2019</a:t>
+              <a:t>12/19/2019</a:t>
             </a:fld>
             <a:endParaRPr lang="en-US" dirty="0"/>
           </a:p>
@@ -878,7 +878,7 @@
           </a:lstStyle>
           <a:p>
             <a:r>
-              <a:rPr lang="en-US" smtClean="0"/>
+              <a:rPr lang="en-US"/>
               <a:t>Click to edit Master title style</a:t>
             </a:r>
             <a:endParaRPr lang="en-US" dirty="0"/>
@@ -996,7 +996,7 @@
           <a:p>
             <a:pPr lvl="0"/>
             <a:r>
-              <a:rPr lang="en-US" smtClean="0"/>
+              <a:rPr lang="en-US"/>
               <a:t>Edit Master text styles</a:t>
             </a:r>
           </a:p>
@@ -1019,7 +1019,7 @@
           <a:p>
             <a:fld id="{563E111F-98C8-4E70-A91E-7E1DDAA7F2CF}" type="datetimeFigureOut">
               <a:rPr lang="en-US" smtClean="0"/>
-              <a:t>12/18/2019</a:t>
+              <a:t>12/19/2019</a:t>
             </a:fld>
             <a:endParaRPr lang="en-US" dirty="0"/>
           </a:p>
@@ -1113,7 +1113,7 @@
           <a:lstStyle/>
           <a:p>
             <a:r>
-              <a:rPr lang="en-US" smtClean="0"/>
+              <a:rPr lang="en-US"/>
               <a:t>Click to edit Master title style</a:t>
             </a:r>
             <a:endParaRPr lang="en-US" dirty="0"/>
@@ -1142,35 +1142,35 @@
           <a:p>
             <a:pPr lvl="0"/>
             <a:r>
-              <a:rPr lang="en-US" smtClean="0"/>
+              <a:rPr lang="en-US"/>
               <a:t>Edit Master text styles</a:t>
             </a:r>
           </a:p>
           <a:p>
             <a:pPr lvl="1"/>
             <a:r>
-              <a:rPr lang="en-US" smtClean="0"/>
+              <a:rPr lang="en-US"/>
               <a:t>Second level</a:t>
             </a:r>
           </a:p>
           <a:p>
             <a:pPr lvl="2"/>
             <a:r>
-              <a:rPr lang="en-US" smtClean="0"/>
+              <a:rPr lang="en-US"/>
               <a:t>Third level</a:t>
             </a:r>
           </a:p>
           <a:p>
             <a:pPr lvl="3"/>
             <a:r>
-              <a:rPr lang="en-US" smtClean="0"/>
+              <a:rPr lang="en-US"/>
               <a:t>Fourth level</a:t>
             </a:r>
           </a:p>
           <a:p>
             <a:pPr lvl="4"/>
             <a:r>
-              <a:rPr lang="en-US" smtClean="0"/>
+              <a:rPr lang="en-US"/>
               <a:t>Fifth level</a:t>
             </a:r>
             <a:endParaRPr lang="en-US" dirty="0"/>
@@ -1199,35 +1199,35 @@
           <a:p>
             <a:pPr lvl="0"/>
             <a:r>
-              <a:rPr lang="en-US" smtClean="0"/>
+              <a:rPr lang="en-US"/>
               <a:t>Edit Master text styles</a:t>
             </a:r>
           </a:p>
           <a:p>
             <a:pPr lvl="1"/>
             <a:r>
-              <a:rPr lang="en-US" smtClean="0"/>
+              <a:rPr lang="en-US"/>
               <a:t>Second level</a:t>
             </a:r>
           </a:p>
           <a:p>
             <a:pPr lvl="2"/>
             <a:r>
-              <a:rPr lang="en-US" smtClean="0"/>
+              <a:rPr lang="en-US"/>
               <a:t>Third level</a:t>
             </a:r>
           </a:p>
           <a:p>
             <a:pPr lvl="3"/>
             <a:r>
-              <a:rPr lang="en-US" smtClean="0"/>
+              <a:rPr lang="en-US"/>
               <a:t>Fourth level</a:t>
             </a:r>
           </a:p>
           <a:p>
             <a:pPr lvl="4"/>
             <a:r>
-              <a:rPr lang="en-US" smtClean="0"/>
+              <a:rPr lang="en-US"/>
               <a:t>Fifth level</a:t>
             </a:r>
             <a:endParaRPr lang="en-US" dirty="0"/>
@@ -1251,7 +1251,7 @@
           <a:p>
             <a:fld id="{563E111F-98C8-4E70-A91E-7E1DDAA7F2CF}" type="datetimeFigureOut">
               <a:rPr lang="en-US" smtClean="0"/>
-              <a:t>12/18/2019</a:t>
+              <a:t>12/19/2019</a:t>
             </a:fld>
             <a:endParaRPr lang="en-US" dirty="0"/>
           </a:p>
@@ -1350,7 +1350,7 @@
           <a:lstStyle/>
           <a:p>
             <a:r>
-              <a:rPr lang="en-US" smtClean="0"/>
+              <a:rPr lang="en-US"/>
               <a:t>Click to edit Master title style</a:t>
             </a:r>
             <a:endParaRPr lang="en-US" dirty="0"/>
@@ -1416,7 +1416,7 @@
           <a:p>
             <a:pPr lvl="0"/>
             <a:r>
-              <a:rPr lang="en-US" smtClean="0"/>
+              <a:rPr lang="en-US"/>
               <a:t>Edit Master text styles</a:t>
             </a:r>
           </a:p>
@@ -1444,35 +1444,35 @@
           <a:p>
             <a:pPr lvl="0"/>
             <a:r>
-              <a:rPr lang="en-US" smtClean="0"/>
+              <a:rPr lang="en-US"/>
               <a:t>Edit Master text styles</a:t>
             </a:r>
           </a:p>
           <a:p>
             <a:pPr lvl="1"/>
             <a:r>
-              <a:rPr lang="en-US" smtClean="0"/>
+              <a:rPr lang="en-US"/>
               <a:t>Second level</a:t>
             </a:r>
           </a:p>
           <a:p>
             <a:pPr lvl="2"/>
             <a:r>
-              <a:rPr lang="en-US" smtClean="0"/>
+              <a:rPr lang="en-US"/>
               <a:t>Third level</a:t>
             </a:r>
           </a:p>
           <a:p>
             <a:pPr lvl="3"/>
             <a:r>
-              <a:rPr lang="en-US" smtClean="0"/>
+              <a:rPr lang="en-US"/>
               <a:t>Fourth level</a:t>
             </a:r>
           </a:p>
           <a:p>
             <a:pPr lvl="4"/>
             <a:r>
-              <a:rPr lang="en-US" smtClean="0"/>
+              <a:rPr lang="en-US"/>
               <a:t>Fifth level</a:t>
             </a:r>
             <a:endParaRPr lang="en-US" dirty="0"/>
@@ -1538,7 +1538,7 @@
           <a:p>
             <a:pPr lvl="0"/>
             <a:r>
-              <a:rPr lang="en-US" smtClean="0"/>
+              <a:rPr lang="en-US"/>
               <a:t>Edit Master text styles</a:t>
             </a:r>
           </a:p>
@@ -1566,35 +1566,35 @@
           <a:p>
             <a:pPr lvl="0"/>
             <a:r>
-              <a:rPr lang="en-US" smtClean="0"/>
+              <a:rPr lang="en-US"/>
               <a:t>Edit Master text styles</a:t>
             </a:r>
           </a:p>
           <a:p>
             <a:pPr lvl="1"/>
             <a:r>
-              <a:rPr lang="en-US" smtClean="0"/>
+              <a:rPr lang="en-US"/>
               <a:t>Second level</a:t>
             </a:r>
           </a:p>
           <a:p>
             <a:pPr lvl="2"/>
             <a:r>
-              <a:rPr lang="en-US" smtClean="0"/>
+              <a:rPr lang="en-US"/>
               <a:t>Third level</a:t>
             </a:r>
           </a:p>
           <a:p>
             <a:pPr lvl="3"/>
             <a:r>
-              <a:rPr lang="en-US" smtClean="0"/>
+              <a:rPr lang="en-US"/>
               <a:t>Fourth level</a:t>
             </a:r>
           </a:p>
           <a:p>
             <a:pPr lvl="4"/>
             <a:r>
-              <a:rPr lang="en-US" smtClean="0"/>
+              <a:rPr lang="en-US"/>
               <a:t>Fifth level</a:t>
             </a:r>
             <a:endParaRPr lang="en-US" dirty="0"/>
@@ -1618,7 +1618,7 @@
           <a:p>
             <a:fld id="{563E111F-98C8-4E70-A91E-7E1DDAA7F2CF}" type="datetimeFigureOut">
               <a:rPr lang="en-US" smtClean="0"/>
-              <a:t>12/18/2019</a:t>
+              <a:t>12/19/2019</a:t>
             </a:fld>
             <a:endParaRPr lang="en-US" dirty="0"/>
           </a:p>
@@ -1712,7 +1712,7 @@
           <a:lstStyle/>
           <a:p>
             <a:r>
-              <a:rPr lang="en-US" smtClean="0"/>
+              <a:rPr lang="en-US"/>
               <a:t>Click to edit Master title style</a:t>
             </a:r>
             <a:endParaRPr lang="en-US" dirty="0"/>
@@ -1736,7 +1736,7 @@
           <a:p>
             <a:fld id="{563E111F-98C8-4E70-A91E-7E1DDAA7F2CF}" type="datetimeFigureOut">
               <a:rPr lang="en-US" smtClean="0"/>
-              <a:t>12/18/2019</a:t>
+              <a:t>12/19/2019</a:t>
             </a:fld>
             <a:endParaRPr lang="en-US" dirty="0"/>
           </a:p>
@@ -1831,7 +1831,7 @@
           <a:p>
             <a:fld id="{563E111F-98C8-4E70-A91E-7E1DDAA7F2CF}" type="datetimeFigureOut">
               <a:rPr lang="en-US" smtClean="0"/>
-              <a:t>12/18/2019</a:t>
+              <a:t>12/19/2019</a:t>
             </a:fld>
             <a:endParaRPr lang="en-US" dirty="0"/>
           </a:p>
@@ -1934,7 +1934,7 @@
           </a:lstStyle>
           <a:p>
             <a:r>
-              <a:rPr lang="en-US" smtClean="0"/>
+              <a:rPr lang="en-US"/>
               <a:t>Click to edit Master title style</a:t>
             </a:r>
             <a:endParaRPr lang="en-US" dirty="0"/>
@@ -1991,35 +1991,35 @@
           <a:p>
             <a:pPr lvl="0"/>
             <a:r>
-              <a:rPr lang="en-US" smtClean="0"/>
+              <a:rPr lang="en-US"/>
               <a:t>Edit Master text styles</a:t>
             </a:r>
           </a:p>
           <a:p>
             <a:pPr lvl="1"/>
             <a:r>
-              <a:rPr lang="en-US" smtClean="0"/>
+              <a:rPr lang="en-US"/>
               <a:t>Second level</a:t>
             </a:r>
           </a:p>
           <a:p>
             <a:pPr lvl="2"/>
             <a:r>
-              <a:rPr lang="en-US" smtClean="0"/>
+              <a:rPr lang="en-US"/>
               <a:t>Third level</a:t>
             </a:r>
           </a:p>
           <a:p>
             <a:pPr lvl="3"/>
             <a:r>
-              <a:rPr lang="en-US" smtClean="0"/>
+              <a:rPr lang="en-US"/>
               <a:t>Fourth level</a:t>
             </a:r>
           </a:p>
           <a:p>
             <a:pPr lvl="4"/>
             <a:r>
-              <a:rPr lang="en-US" smtClean="0"/>
+              <a:rPr lang="en-US"/>
               <a:t>Fifth level</a:t>
             </a:r>
             <a:endParaRPr lang="en-US" dirty="0"/>
@@ -2085,7 +2085,7 @@
           <a:p>
             <a:pPr lvl="0"/>
             <a:r>
-              <a:rPr lang="en-US" smtClean="0"/>
+              <a:rPr lang="en-US"/>
               <a:t>Edit Master text styles</a:t>
             </a:r>
           </a:p>
@@ -2108,7 +2108,7 @@
           <a:p>
             <a:fld id="{563E111F-98C8-4E70-A91E-7E1DDAA7F2CF}" type="datetimeFigureOut">
               <a:rPr lang="en-US" smtClean="0"/>
-              <a:t>12/18/2019</a:t>
+              <a:t>12/19/2019</a:t>
             </a:fld>
             <a:endParaRPr lang="en-US" dirty="0"/>
           </a:p>
@@ -2211,7 +2211,7 @@
           </a:lstStyle>
           <a:p>
             <a:r>
-              <a:rPr lang="en-US" smtClean="0"/>
+              <a:rPr lang="en-US"/>
               <a:t>Click to edit Master title style</a:t>
             </a:r>
             <a:endParaRPr lang="en-US" dirty="0"/>
@@ -2276,10 +2276,9 @@
           </a:lstStyle>
           <a:p>
             <a:r>
-              <a:rPr lang="en-US" dirty="0" smtClean="0"/>
+              <a:rPr lang="en-US" dirty="0"/>
               <a:t>Click icon to add picture</a:t>
             </a:r>
-            <a:endParaRPr lang="en-US" dirty="0"/>
           </a:p>
         </p:txBody>
       </p:sp>
@@ -2342,7 +2341,7 @@
           <a:p>
             <a:pPr lvl="0"/>
             <a:r>
-              <a:rPr lang="en-US" smtClean="0"/>
+              <a:rPr lang="en-US"/>
               <a:t>Edit Master text styles</a:t>
             </a:r>
           </a:p>
@@ -2365,7 +2364,7 @@
           <a:p>
             <a:fld id="{563E111F-98C8-4E70-A91E-7E1DDAA7F2CF}" type="datetimeFigureOut">
               <a:rPr lang="en-US" smtClean="0"/>
-              <a:t>12/18/2019</a:t>
+              <a:t>12/19/2019</a:t>
             </a:fld>
             <a:endParaRPr lang="en-US" dirty="0"/>
           </a:p>
@@ -2474,7 +2473,7 @@
           <a:lstStyle/>
           <a:p>
             <a:r>
-              <a:rPr lang="en-US" smtClean="0"/>
+              <a:rPr lang="en-US"/>
               <a:t>Click to edit Master title style</a:t>
             </a:r>
             <a:endParaRPr lang="en-US" dirty="0"/>
@@ -2508,35 +2507,35 @@
           <a:p>
             <a:pPr lvl="0"/>
             <a:r>
-              <a:rPr lang="en-US" smtClean="0"/>
+              <a:rPr lang="en-US"/>
               <a:t>Edit Master text styles</a:t>
             </a:r>
           </a:p>
           <a:p>
             <a:pPr lvl="1"/>
             <a:r>
-              <a:rPr lang="en-US" smtClean="0"/>
+              <a:rPr lang="en-US"/>
               <a:t>Second level</a:t>
             </a:r>
           </a:p>
           <a:p>
             <a:pPr lvl="2"/>
             <a:r>
-              <a:rPr lang="en-US" smtClean="0"/>
+              <a:rPr lang="en-US"/>
               <a:t>Third level</a:t>
             </a:r>
           </a:p>
           <a:p>
             <a:pPr lvl="3"/>
             <a:r>
-              <a:rPr lang="en-US" smtClean="0"/>
+              <a:rPr lang="en-US"/>
               <a:t>Fourth level</a:t>
             </a:r>
           </a:p>
           <a:p>
             <a:pPr lvl="4"/>
             <a:r>
-              <a:rPr lang="en-US" smtClean="0"/>
+              <a:rPr lang="en-US"/>
               <a:t>Fifth level</a:t>
             </a:r>
             <a:endParaRPr lang="en-US" dirty="0"/>
@@ -2578,7 +2577,7 @@
           <a:p>
             <a:fld id="{563E111F-98C8-4E70-A91E-7E1DDAA7F2CF}" type="datetimeFigureOut">
               <a:rPr lang="en-US" smtClean="0"/>
-              <a:t>12/18/2019</a:t>
+              <a:t>12/19/2019</a:t>
             </a:fld>
             <a:endParaRPr lang="en-US" dirty="0"/>
           </a:p>
@@ -3028,56 +3027,13 @@
       </p:sp>
       <p:sp>
         <p:nvSpPr>
-          <p:cNvPr id="75" name="TextBox 74"/>
-          <p:cNvSpPr txBox="1"/>
-          <p:nvPr/>
-        </p:nvSpPr>
-        <p:spPr>
-          <a:xfrm>
-            <a:off x="16126832" y="24328958"/>
-            <a:ext cx="16654800" cy="1015663"/>
-          </a:xfrm>
-          <a:prstGeom prst="rect">
-            <a:avLst/>
-          </a:prstGeom>
-          <a:solidFill>
-            <a:srgbClr val="FF0000"/>
-          </a:solidFill>
-        </p:spPr>
-        <p:txBody>
-          <a:bodyPr wrap="square" rtlCol="0">
-            <a:spAutoFit/>
-          </a:bodyPr>
-          <a:lstStyle/>
-          <a:p>
-            <a:pPr algn="ctr"/>
-            <a:r>
-              <a:rPr lang="en-US" sz="6000" b="1" dirty="0">
-                <a:ln>
-                  <a:solidFill>
-                    <a:schemeClr val="bg1"/>
-                  </a:solidFill>
-                </a:ln>
-                <a:solidFill>
-                  <a:schemeClr val="bg1"/>
-                </a:solidFill>
-                <a:latin typeface="Arial" panose="020B0604020202020204" pitchFamily="34" charset="0"/>
-                <a:cs typeface="Arial" panose="020B0604020202020204" pitchFamily="34" charset="0"/>
-              </a:rPr>
-              <a:t>DESIGN CONCEPTS</a:t>
-            </a:r>
-          </a:p>
-        </p:txBody>
-      </p:sp>
-      <p:sp>
-        <p:nvSpPr>
           <p:cNvPr id="26" name="TextBox 25"/>
           <p:cNvSpPr txBox="1"/>
           <p:nvPr/>
         </p:nvSpPr>
         <p:spPr>
           <a:xfrm>
-            <a:off x="0" y="22544154"/>
+            <a:off x="86833" y="18136270"/>
             <a:ext cx="15728137" cy="1015663"/>
           </a:xfrm>
           <a:prstGeom prst="rect">
@@ -3284,36 +3240,6 @@
           </a:p>
         </p:txBody>
       </p:sp>
-      <p:pic>
-        <p:nvPicPr>
-          <p:cNvPr id="35" name="Picture 34"/>
-          <p:cNvPicPr>
-            <a:picLocks noChangeAspect="1"/>
-          </p:cNvPicPr>
-          <p:nvPr/>
-        </p:nvPicPr>
-        <p:blipFill>
-          <a:blip r:embed="rId2">
-            <a:extLst>
-              <a:ext uri="{28A0092B-C50C-407E-A947-70E740481C1C}">
-                <a14:useLocalDpi xmlns:a14="http://schemas.microsoft.com/office/drawing/2010/main" val="0"/>
-              </a:ext>
-            </a:extLst>
-          </a:blip>
-          <a:stretch>
-            <a:fillRect/>
-          </a:stretch>
-        </p:blipFill>
-        <p:spPr>
-          <a:xfrm>
-            <a:off x="18119672" y="17869710"/>
-            <a:ext cx="12407690" cy="6371516"/>
-          </a:xfrm>
-          <a:prstGeom prst="rect">
-            <a:avLst/>
-          </a:prstGeom>
-        </p:spPr>
-      </p:pic>
       <p:sp>
         <p:nvSpPr>
           <p:cNvPr id="4" name="TextBox 3"/>
@@ -3344,10 +3270,6 @@
               </a:rPr>
               <a:t>Road Curvature Decomposition for Autonomous Guidance</a:t>
             </a:r>
-            <a:endParaRPr lang="en-US" sz="7200" b="1" dirty="0">
-              <a:latin typeface="Arial" panose="020B0604020202020204" pitchFamily="34" charset="0"/>
-              <a:cs typeface="Arial" panose="020B0604020202020204" pitchFamily="34" charset="0"/>
-            </a:endParaRPr>
           </a:p>
         </p:txBody>
       </p:sp>
@@ -3374,18 +3296,11 @@
           <a:lstStyle/>
           <a:p>
             <a:r>
-              <a:rPr lang="en-US" sz="5400" dirty="0" smtClean="0">
-                <a:latin typeface="Arial" panose="020B0604020202020204" pitchFamily="34" charset="0"/>
-                <a:cs typeface="Arial" panose="020B0604020202020204" pitchFamily="34" charset="0"/>
-              </a:rPr>
-              <a:t>Ricardo Jacome, </a:t>
-            </a:r>
-            <a:r>
               <a:rPr lang="en-US" sz="5400" dirty="0">
                 <a:latin typeface="Arial" panose="020B0604020202020204" pitchFamily="34" charset="0"/>
                 <a:cs typeface="Arial" panose="020B0604020202020204" pitchFamily="34" charset="0"/>
               </a:rPr>
-              <a:t>Mechanical Engineering Graduate Research Assistant, University of Nebraska -Lincoln</a:t>
+              <a:t>Ricardo Jacome, Mechanical Engineering Graduate Research Assistant, University of Nebraska -Lincoln</a:t>
             </a:r>
           </a:p>
         </p:txBody>
@@ -3399,7 +3314,7 @@
           <p:nvPr/>
         </p:nvPicPr>
         <p:blipFill>
-          <a:blip r:embed="rId3">
+          <a:blip r:embed="rId2">
             <a:extLst>
               <a:ext uri="{28A0092B-C50C-407E-A947-70E740481C1C}">
                 <a14:useLocalDpi xmlns:a14="http://schemas.microsoft.com/office/drawing/2010/main" val="0"/>
@@ -3440,7 +3355,7 @@
           <p:nvPr/>
         </p:nvPicPr>
         <p:blipFill>
-          <a:blip r:embed="rId4">
+          <a:blip r:embed="rId3">
             <a:clrChange>
               <a:clrFrom>
                 <a:srgbClr val="FFFFFF"/>
@@ -3692,16 +3607,12 @@
               <a:buChar char="-"/>
             </a:pPr>
             <a:r>
-              <a:rPr lang="en-US" sz="6000" dirty="0" smtClean="0">
+              <a:rPr lang="en-US" sz="6000" dirty="0">
                 <a:latin typeface="Arial" panose="020B0604020202020204" pitchFamily="34" charset="0"/>
                 <a:cs typeface="Arial" panose="020B0604020202020204" pitchFamily="34" charset="0"/>
               </a:rPr>
-              <a:t>Develop a method for discretizing geospatial data and providing vehicle path guidance for autonomous vehicles.</a:t>
-            </a:r>
-            <a:endParaRPr lang="en-US" sz="6000" dirty="0">
-              <a:latin typeface="Arial" panose="020B0604020202020204" pitchFamily="34" charset="0"/>
-              <a:cs typeface="Arial" panose="020B0604020202020204" pitchFamily="34" charset="0"/>
-            </a:endParaRPr>
+              <a:t>Develop a method for discretizing geospatial data and providing path guidance for autonomous vehicles.</a:t>
+            </a:r>
           </a:p>
         </p:txBody>
       </p:sp>
@@ -3739,14 +3650,7 @@
                 <a:latin typeface="Arial" panose="020B0604020202020204" pitchFamily="34" charset="0"/>
                 <a:cs typeface="Arial" panose="020B0604020202020204" pitchFamily="34" charset="0"/>
               </a:rPr>
-              <a:t>Vehicle autonomy has been touted as the future of transportation, but there are significant challenges which remain to be addressed</a:t>
-            </a:r>
-            <a:r>
-              <a:rPr lang="en-US" sz="4800" dirty="0" smtClean="0">
-                <a:latin typeface="Arial" panose="020B0604020202020204" pitchFamily="34" charset="0"/>
-                <a:cs typeface="Arial" panose="020B0604020202020204" pitchFamily="34" charset="0"/>
-              </a:rPr>
-              <a:t>.</a:t>
+              <a:t>Vehicle autonomy has been touted as the future of transportation, but there are significant challenges which remain to be addressed.</a:t>
             </a:r>
           </a:p>
           <a:p>
@@ -3762,28 +3666,7 @@
                 <a:latin typeface="Arial" panose="020B0604020202020204" pitchFamily="34" charset="0"/>
                 <a:cs typeface="Arial" panose="020B0604020202020204" pitchFamily="34" charset="0"/>
               </a:rPr>
-              <a:t>Tremendous growth has been achieved in </a:t>
-            </a:r>
-            <a:r>
-              <a:rPr lang="en-US" sz="4800" dirty="0" smtClean="0">
-                <a:latin typeface="Arial" panose="020B0604020202020204" pitchFamily="34" charset="0"/>
-                <a:cs typeface="Arial" panose="020B0604020202020204" pitchFamily="34" charset="0"/>
-              </a:rPr>
-              <a:t>“</a:t>
-            </a:r>
-            <a:r>
-              <a:rPr lang="en-US" sz="4800" dirty="0">
-                <a:latin typeface="Arial" panose="020B0604020202020204" pitchFamily="34" charset="0"/>
-                <a:cs typeface="Arial" panose="020B0604020202020204" pitchFamily="34" charset="0"/>
-              </a:rPr>
-              <a:t>Advanced Driver Assistance Systems</a:t>
-            </a:r>
-            <a:r>
-              <a:rPr lang="en-US" sz="4800" dirty="0" smtClean="0">
-                <a:latin typeface="Arial" panose="020B0604020202020204" pitchFamily="34" charset="0"/>
-                <a:cs typeface="Arial" panose="020B0604020202020204" pitchFamily="34" charset="0"/>
-              </a:rPr>
-              <a:t>”</a:t>
+              <a:t>Tremendous growth has been achieved in “Advanced Driver Assistance Systems”</a:t>
             </a:r>
           </a:p>
           <a:p>
@@ -3795,18 +3678,11 @@
               <a:buChar char="-"/>
             </a:pPr>
             <a:r>
-              <a:rPr lang="en-US" sz="4800" dirty="0" smtClean="0">
-                <a:latin typeface="Arial" panose="020B0604020202020204" pitchFamily="34" charset="0"/>
-                <a:cs typeface="Arial" panose="020B0604020202020204" pitchFamily="34" charset="0"/>
-              </a:rPr>
-              <a:t>Need </a:t>
-            </a:r>
-            <a:r>
               <a:rPr lang="en-US" sz="4800" dirty="0">
                 <a:latin typeface="Arial" panose="020B0604020202020204" pitchFamily="34" charset="0"/>
                 <a:cs typeface="Arial" panose="020B0604020202020204" pitchFamily="34" charset="0"/>
               </a:rPr>
-              <a:t>low-cost, crashworthy solution functional for many impact conditions and with narrow footprint</a:t>
+              <a:t>Need low-cost, crashworthy solution functional for many impact conditions and with narrow footprint</a:t>
             </a:r>
           </a:p>
           <a:p>
@@ -3836,7 +3712,7 @@
           <p:nvPr/>
         </p:nvPicPr>
         <p:blipFill>
-          <a:blip r:embed="rId5">
+          <a:blip r:embed="rId4">
             <a:extLst>
               <a:ext uri="{28A0092B-C50C-407E-A947-70E740481C1C}">
                 <a14:useLocalDpi xmlns:a14="http://schemas.microsoft.com/office/drawing/2010/main" val="0"/>
@@ -3903,18 +3779,11 @@
               <a:buChar char="-"/>
             </a:pPr>
             <a:r>
-              <a:rPr lang="en-US" sz="4800" dirty="0" smtClean="0">
-                <a:latin typeface="Arial" panose="020B0604020202020204" pitchFamily="34" charset="0"/>
-                <a:cs typeface="Arial" panose="020B0604020202020204" pitchFamily="34" charset="0"/>
-              </a:rPr>
-              <a:t>Impact </a:t>
-            </a:r>
-            <a:r>
               <a:rPr lang="en-US" sz="4800" dirty="0">
                 <a:latin typeface="Arial" panose="020B0604020202020204" pitchFamily="34" charset="0"/>
                 <a:cs typeface="Arial" panose="020B0604020202020204" pitchFamily="34" charset="0"/>
               </a:rPr>
-              <a:t>conditions determined by length of need</a:t>
+              <a:t>Impact conditions determined by length of need</a:t>
             </a:r>
           </a:p>
         </p:txBody>
@@ -3982,18 +3851,11 @@
           <a:p>
             <a:pPr algn="ctr"/>
             <a:r>
-              <a:rPr lang="en-US" sz="5400" dirty="0" smtClean="0">
-                <a:latin typeface="Arial" panose="020B0604020202020204" pitchFamily="34" charset="0"/>
-                <a:cs typeface="Arial" panose="020B0604020202020204" pitchFamily="34" charset="0"/>
-              </a:rPr>
-              <a:t>Jacome, Sweigard, </a:t>
-            </a:r>
-            <a:r>
               <a:rPr lang="en-US" sz="5400" dirty="0">
                 <a:latin typeface="Arial" panose="020B0604020202020204" pitchFamily="34" charset="0"/>
                 <a:cs typeface="Arial" panose="020B0604020202020204" pitchFamily="34" charset="0"/>
               </a:rPr>
-              <a:t>Stolle  </a:t>
+              <a:t>Jacome, Sweigard, Stolle  </a:t>
             </a:r>
           </a:p>
         </p:txBody>
@@ -4006,7 +3868,7 @@
         </p:nvSpPr>
         <p:spPr>
           <a:xfrm>
-            <a:off x="153243" y="33813354"/>
+            <a:off x="148733" y="34298490"/>
             <a:ext cx="15226292" cy="2616101"/>
           </a:xfrm>
           <a:prstGeom prst="rect">
@@ -4106,14 +3968,46 @@
       </p:cxnSp>
       <p:sp>
         <p:nvSpPr>
-          <p:cNvPr id="76" name="TextBox 75"/>
+          <p:cNvPr id="21" name="TextBox 20"/>
           <p:cNvSpPr txBox="1"/>
           <p:nvPr/>
         </p:nvSpPr>
         <p:spPr>
           <a:xfrm>
-            <a:off x="16290140" y="25474834"/>
-            <a:ext cx="16425139" cy="4678204"/>
+            <a:off x="36914616" y="13302605"/>
+            <a:ext cx="3265638" cy="523220"/>
+          </a:xfrm>
+          <a:prstGeom prst="rect">
+            <a:avLst/>
+          </a:prstGeom>
+          <a:noFill/>
+        </p:spPr>
+        <p:txBody>
+          <a:bodyPr wrap="none" rtlCol="0">
+            <a:spAutoFit/>
+          </a:bodyPr>
+          <a:lstStyle/>
+          <a:p>
+            <a:r>
+              <a:rPr lang="en-US" sz="2800" dirty="0">
+                <a:latin typeface="Arial" panose="020B0604020202020204" pitchFamily="34" charset="0"/>
+                <a:cs typeface="Arial" panose="020B0604020202020204" pitchFamily="34" charset="0"/>
+              </a:rPr>
+              <a:t>Initial Configuration</a:t>
+            </a:r>
+          </a:p>
+        </p:txBody>
+      </p:sp>
+      <p:sp>
+        <p:nvSpPr>
+          <p:cNvPr id="62" name="TextBox 61"/>
+          <p:cNvSpPr txBox="1"/>
+          <p:nvPr/>
+        </p:nvSpPr>
+        <p:spPr>
+          <a:xfrm>
+            <a:off x="33261185" y="31438737"/>
+            <a:ext cx="17833987" cy="5570756"/>
           </a:xfrm>
           <a:prstGeom prst="rect">
             <a:avLst/>
@@ -4138,7 +4032,7 @@
                 <a:latin typeface="Arial" panose="020B0604020202020204" pitchFamily="34" charset="0"/>
                 <a:cs typeface="Arial" panose="020B0604020202020204" pitchFamily="34" charset="0"/>
               </a:rPr>
-              <a:t>Fifteen concepts generated, and ranked based on analysis of: 1) safety performance 2) maintenance and repair costs 3) effort to develop concept 4) installation cost </a:t>
+              <a:t>Net attenuator selected for testing and stopped a 5,259-lb bogie vehicle traveling at  roughly 60 mph in 43 ft or less</a:t>
             </a:r>
           </a:p>
           <a:p>
@@ -4154,35 +4048,75 @@
                 <a:latin typeface="Arial" panose="020B0604020202020204" pitchFamily="34" charset="0"/>
                 <a:cs typeface="Arial" panose="020B0604020202020204" pitchFamily="34" charset="0"/>
               </a:rPr>
-              <a:t>Highest-ranked concepts: 1) net attenuator/end terminal 2) sand barrels/end terminal 3) bullnose with secondary energy absorber</a:t>
+              <a:t>Component testing suggested design would work under variety of impact conditions, speeds, and angles, and was versatile for installation</a:t>
+            </a:r>
+          </a:p>
+          <a:p>
+            <a:pPr marL="457209" indent="-457209">
+              <a:spcAft>
+                <a:spcPts val="1200"/>
+              </a:spcAft>
+              <a:buFontTx/>
+              <a:buChar char="-"/>
+            </a:pPr>
+            <a:r>
+              <a:rPr lang="en-US" sz="4800" dirty="0">
+                <a:latin typeface="Arial" panose="020B0604020202020204" pitchFamily="34" charset="0"/>
+                <a:cs typeface="Arial" panose="020B0604020202020204" pitchFamily="34" charset="0"/>
+              </a:rPr>
+              <a:t>Design must be paired with other crashworthy crash cushion (in development) – future work</a:t>
+            </a:r>
+          </a:p>
+        </p:txBody>
+      </p:sp>
+      <p:sp>
+        <p:nvSpPr>
+          <p:cNvPr id="28" name="TextBox 27"/>
+          <p:cNvSpPr txBox="1"/>
+          <p:nvPr/>
+        </p:nvSpPr>
+        <p:spPr>
+          <a:xfrm>
+            <a:off x="43518574" y="13026377"/>
+            <a:ext cx="4064959" cy="523220"/>
+          </a:xfrm>
+          <a:prstGeom prst="rect">
+            <a:avLst/>
+          </a:prstGeom>
+          <a:noFill/>
+        </p:spPr>
+        <p:txBody>
+          <a:bodyPr wrap="none" rtlCol="0">
+            <a:spAutoFit/>
+          </a:bodyPr>
+          <a:lstStyle/>
+          <a:p>
+            <a:r>
+              <a:rPr lang="en-US" sz="2800" dirty="0">
+                <a:latin typeface="Arial" panose="020B0604020202020204" pitchFamily="34" charset="0"/>
+                <a:cs typeface="Arial" panose="020B0604020202020204" pitchFamily="34" charset="0"/>
+              </a:rPr>
+              <a:t>Energy Absorber Failure</a:t>
             </a:r>
           </a:p>
         </p:txBody>
       </p:sp>
       <p:pic>
         <p:nvPicPr>
-          <p:cNvPr id="89" name="Picture 88"/>
-          <p:cNvPicPr>
-            <a:picLocks noChangeAspect="1"/>
-          </p:cNvPicPr>
+          <p:cNvPr id="58" name="Picture 57"/>
+          <p:cNvPicPr/>
           <p:nvPr/>
         </p:nvPicPr>
         <p:blipFill>
-          <a:blip r:embed="rId6">
-            <a:extLst>
-              <a:ext uri="{28A0092B-C50C-407E-A947-70E740481C1C}">
-                <a14:useLocalDpi xmlns:a14="http://schemas.microsoft.com/office/drawing/2010/main" val="0"/>
-              </a:ext>
-            </a:extLst>
-          </a:blip>
+          <a:blip r:embed="rId5"/>
           <a:stretch>
             <a:fillRect/>
           </a:stretch>
         </p:blipFill>
         <p:spPr>
           <a:xfrm>
-            <a:off x="16238364" y="13959494"/>
-            <a:ext cx="16170306" cy="3793432"/>
+            <a:off x="18699357" y="7992377"/>
+            <a:ext cx="10614244" cy="8247611"/>
           </a:xfrm>
           <a:prstGeom prst="rect">
             <a:avLst/>
@@ -4191,13 +4125,45 @@
       </p:pic>
       <p:pic>
         <p:nvPicPr>
-          <p:cNvPr id="19" name="Picture 18"/>
-          <p:cNvPicPr>
-            <a:picLocks noChangeAspect="1"/>
-          </p:cNvPicPr>
+          <p:cNvPr id="40" name="Picture 39">
+            <a:extLst>
+              <a:ext uri="{FF2B5EF4-FFF2-40B4-BE49-F238E27FC236}">
+                <a16:creationId xmlns:a16="http://schemas.microsoft.com/office/drawing/2014/main" id="{EB5B5399-F825-464C-9F27-BDDBF732ACE5}"/>
+              </a:ext>
+            </a:extLst>
+          </p:cNvPr>
+          <p:cNvPicPr/>
           <p:nvPr/>
         </p:nvPicPr>
         <p:blipFill>
+          <a:blip r:embed="rId6"/>
+          <a:stretch>
+            <a:fillRect/>
+          </a:stretch>
+        </p:blipFill>
+        <p:spPr>
+          <a:xfrm>
+            <a:off x="20192045" y="21095788"/>
+            <a:ext cx="8879976" cy="11111341"/>
+          </a:xfrm>
+          <a:prstGeom prst="rect">
+            <a:avLst/>
+          </a:prstGeom>
+        </p:spPr>
+      </p:pic>
+      <p:pic>
+        <p:nvPicPr>
+          <p:cNvPr id="44" name="Picture 43">
+            <a:extLst>
+              <a:ext uri="{FF2B5EF4-FFF2-40B4-BE49-F238E27FC236}">
+                <a16:creationId xmlns:a16="http://schemas.microsoft.com/office/drawing/2014/main" id="{8A31D47B-2F80-40B8-8997-85AEEDF50CFF}"/>
+              </a:ext>
+            </a:extLst>
+          </p:cNvPr>
+          <p:cNvPicPr/>
+          <p:nvPr/>
+        </p:nvPicPr>
+        <p:blipFill rotWithShape="1">
           <a:blip r:embed="rId7">
             <a:extLst>
               <a:ext uri="{28A0092B-C50C-407E-A947-70E740481C1C}">
@@ -4205,292 +4171,36 @@
               </a:ext>
             </a:extLst>
           </a:blip>
-          <a:stretch>
-            <a:fillRect/>
-          </a:stretch>
+          <a:srcRect r="9897"/>
+          <a:stretch/>
         </p:blipFill>
-        <p:spPr>
-          <a:xfrm>
-            <a:off x="37954192" y="6292423"/>
-            <a:ext cx="9219561" cy="3164110"/>
-          </a:xfrm>
-          <a:prstGeom prst="rect">
-            <a:avLst/>
-          </a:prstGeom>
-        </p:spPr>
-      </p:pic>
-      <p:sp>
-        <p:nvSpPr>
-          <p:cNvPr id="20" name="TextBox 19"/>
-          <p:cNvSpPr txBox="1"/>
-          <p:nvPr/>
-        </p:nvSpPr>
-        <p:spPr>
-          <a:xfrm>
-            <a:off x="41145951" y="9275747"/>
-            <a:ext cx="2935612" cy="523220"/>
+        <p:spPr bwMode="auto">
+          <a:xfrm>
+            <a:off x="34005184" y="7263053"/>
+            <a:ext cx="7311516" cy="5654589"/>
           </a:xfrm>
           <a:prstGeom prst="rect">
             <a:avLst/>
           </a:prstGeom>
           <a:noFill/>
-        </p:spPr>
-        <p:txBody>
-          <a:bodyPr wrap="none" rtlCol="0">
-            <a:spAutoFit/>
-          </a:bodyPr>
-          <a:lstStyle/>
-          <a:p>
-            <a:r>
-              <a:rPr lang="en-US" sz="2800" dirty="0">
-                <a:latin typeface="Arial" panose="020B0604020202020204" pitchFamily="34" charset="0"/>
-                <a:cs typeface="Arial" panose="020B0604020202020204" pitchFamily="34" charset="0"/>
-              </a:rPr>
-              <a:t>Bogie Test Matrix</a:t>
-            </a:r>
-          </a:p>
-        </p:txBody>
-      </p:sp>
-      <p:sp>
-        <p:nvSpPr>
-          <p:cNvPr id="21" name="TextBox 20"/>
-          <p:cNvSpPr txBox="1"/>
-          <p:nvPr/>
-        </p:nvSpPr>
-        <p:spPr>
-          <a:xfrm>
-            <a:off x="34746875" y="14121515"/>
-            <a:ext cx="3265638" cy="523220"/>
-          </a:xfrm>
-          <a:prstGeom prst="rect">
-            <a:avLst/>
-          </a:prstGeom>
-          <a:noFill/>
-        </p:spPr>
-        <p:txBody>
-          <a:bodyPr wrap="none" rtlCol="0">
-            <a:spAutoFit/>
-          </a:bodyPr>
-          <a:lstStyle/>
-          <a:p>
-            <a:r>
-              <a:rPr lang="en-US" sz="2800" dirty="0">
-                <a:latin typeface="Arial" panose="020B0604020202020204" pitchFamily="34" charset="0"/>
-                <a:cs typeface="Arial" panose="020B0604020202020204" pitchFamily="34" charset="0"/>
-              </a:rPr>
-              <a:t>Initial Configuration</a:t>
-            </a:r>
-          </a:p>
-        </p:txBody>
-      </p:sp>
-      <p:sp>
-        <p:nvSpPr>
-          <p:cNvPr id="34" name="TextBox 33"/>
-          <p:cNvSpPr txBox="1"/>
-          <p:nvPr/>
-        </p:nvSpPr>
-        <p:spPr>
-          <a:xfrm>
-            <a:off x="47040827" y="14125647"/>
-            <a:ext cx="3645550" cy="523220"/>
-          </a:xfrm>
-          <a:prstGeom prst="rect">
-            <a:avLst/>
-          </a:prstGeom>
-          <a:noFill/>
-        </p:spPr>
-        <p:txBody>
-          <a:bodyPr wrap="none" rtlCol="0">
-            <a:spAutoFit/>
-          </a:bodyPr>
-          <a:lstStyle/>
-          <a:p>
-            <a:r>
-              <a:rPr lang="en-US" sz="2800" dirty="0">
-                <a:latin typeface="Arial" panose="020B0604020202020204" pitchFamily="34" charset="0"/>
-                <a:cs typeface="Arial" panose="020B0604020202020204" pitchFamily="34" charset="0"/>
-              </a:rPr>
-              <a:t>Second Configuration</a:t>
-            </a:r>
-          </a:p>
-        </p:txBody>
-      </p:sp>
-      <p:sp>
-        <p:nvSpPr>
-          <p:cNvPr id="62" name="TextBox 61"/>
-          <p:cNvSpPr txBox="1"/>
-          <p:nvPr/>
-        </p:nvSpPr>
-        <p:spPr>
-          <a:xfrm>
-            <a:off x="33261185" y="31438737"/>
-            <a:ext cx="17833987" cy="5570756"/>
-          </a:xfrm>
-          <a:prstGeom prst="rect">
-            <a:avLst/>
-          </a:prstGeom>
-          <a:noFill/>
-        </p:spPr>
-        <p:txBody>
-          <a:bodyPr wrap="square" rtlCol="0">
-            <a:spAutoFit/>
-          </a:bodyPr>
-          <a:lstStyle/>
-          <a:p>
-            <a:pPr marL="457209" indent="-457209">
-              <a:spcAft>
-                <a:spcPts val="1200"/>
-              </a:spcAft>
-              <a:buFontTx/>
-              <a:buChar char="-"/>
-            </a:pPr>
-            <a:r>
-              <a:rPr lang="en-US" sz="4800" dirty="0">
-                <a:latin typeface="Arial" panose="020B0604020202020204" pitchFamily="34" charset="0"/>
-                <a:cs typeface="Arial" panose="020B0604020202020204" pitchFamily="34" charset="0"/>
-              </a:rPr>
-              <a:t>Net attenuator selected for testing and stopped a 5,259-lb bogie vehicle traveling at  roughly 60 mph in 43 ft or less</a:t>
-            </a:r>
-          </a:p>
-          <a:p>
-            <a:pPr marL="457209" indent="-457209">
-              <a:spcAft>
-                <a:spcPts val="1200"/>
-              </a:spcAft>
-              <a:buFontTx/>
-              <a:buChar char="-"/>
-            </a:pPr>
-            <a:r>
-              <a:rPr lang="en-US" sz="4800" dirty="0">
-                <a:latin typeface="Arial" panose="020B0604020202020204" pitchFamily="34" charset="0"/>
-                <a:cs typeface="Arial" panose="020B0604020202020204" pitchFamily="34" charset="0"/>
-              </a:rPr>
-              <a:t>Component testing suggested design would work under variety of impact conditions, speeds, and angles, and was versatile for installation</a:t>
-            </a:r>
-          </a:p>
-          <a:p>
-            <a:pPr marL="457209" indent="-457209">
-              <a:spcAft>
-                <a:spcPts val="1200"/>
-              </a:spcAft>
-              <a:buFontTx/>
-              <a:buChar char="-"/>
-            </a:pPr>
-            <a:r>
-              <a:rPr lang="en-US" sz="4800" dirty="0">
-                <a:latin typeface="Arial" panose="020B0604020202020204" pitchFamily="34" charset="0"/>
-                <a:cs typeface="Arial" panose="020B0604020202020204" pitchFamily="34" charset="0"/>
-              </a:rPr>
-              <a:t>Design must be paired with other crashworthy crash cushion (in development) – future work</a:t>
-            </a:r>
-          </a:p>
-        </p:txBody>
-      </p:sp>
-      <p:sp>
-        <p:nvSpPr>
-          <p:cNvPr id="28" name="TextBox 27"/>
-          <p:cNvSpPr txBox="1"/>
-          <p:nvPr/>
-        </p:nvSpPr>
-        <p:spPr>
-          <a:xfrm>
-            <a:off x="41075988" y="14138019"/>
-            <a:ext cx="4064959" cy="523220"/>
-          </a:xfrm>
-          <a:prstGeom prst="rect">
-            <a:avLst/>
-          </a:prstGeom>
-          <a:noFill/>
-        </p:spPr>
-        <p:txBody>
-          <a:bodyPr wrap="none" rtlCol="0">
-            <a:spAutoFit/>
-          </a:bodyPr>
-          <a:lstStyle/>
-          <a:p>
-            <a:r>
-              <a:rPr lang="en-US" sz="2800" dirty="0">
-                <a:latin typeface="Arial" panose="020B0604020202020204" pitchFamily="34" charset="0"/>
-                <a:cs typeface="Arial" panose="020B0604020202020204" pitchFamily="34" charset="0"/>
-              </a:rPr>
-              <a:t>Energy Absorber Failure</a:t>
-            </a:r>
-          </a:p>
-        </p:txBody>
-      </p:sp>
-      <p:sp>
-        <p:nvSpPr>
-          <p:cNvPr id="29" name="TextBox 28"/>
-          <p:cNvSpPr txBox="1"/>
-          <p:nvPr/>
-        </p:nvSpPr>
-        <p:spPr>
-          <a:xfrm>
-            <a:off x="33951573" y="14742063"/>
-            <a:ext cx="16787834" cy="707886"/>
-          </a:xfrm>
-          <a:prstGeom prst="rect">
-            <a:avLst/>
-          </a:prstGeom>
-          <a:noFill/>
-        </p:spPr>
-        <p:txBody>
-          <a:bodyPr wrap="square" rtlCol="0">
-            <a:spAutoFit/>
-          </a:bodyPr>
-          <a:lstStyle/>
-          <a:p>
-            <a:r>
-              <a:rPr lang="en-US" sz="4000" dirty="0">
-                <a:latin typeface="Arial" panose="020B0604020202020204" pitchFamily="34" charset="0"/>
-                <a:cs typeface="Arial" panose="020B0604020202020204" pitchFamily="34" charset="0"/>
-              </a:rPr>
-              <a:t>IRA-4: 5,259-lb bogie at 59.5 mph and 90 degree impact angle on center  </a:t>
-            </a:r>
-          </a:p>
-        </p:txBody>
-      </p:sp>
-      <p:sp>
-        <p:nvSpPr>
-          <p:cNvPr id="59" name="TextBox 58"/>
-          <p:cNvSpPr txBox="1"/>
-          <p:nvPr/>
-        </p:nvSpPr>
-        <p:spPr>
-          <a:xfrm>
-            <a:off x="33951573" y="19427619"/>
-            <a:ext cx="16787834" cy="707886"/>
-          </a:xfrm>
-          <a:prstGeom prst="rect">
-            <a:avLst/>
-          </a:prstGeom>
-          <a:noFill/>
-        </p:spPr>
-        <p:txBody>
-          <a:bodyPr wrap="square" rtlCol="0">
-            <a:spAutoFit/>
-          </a:bodyPr>
-          <a:lstStyle/>
-          <a:p>
-            <a:r>
-              <a:rPr lang="en-US" sz="4000" dirty="0">
-                <a:latin typeface="Arial" panose="020B0604020202020204" pitchFamily="34" charset="0"/>
-                <a:cs typeface="Arial" panose="020B0604020202020204" pitchFamily="34" charset="0"/>
-              </a:rPr>
-              <a:t>IRA-3: 5,259-lb bogie at 58.0 mph and 60 degree impact angle off center  </a:t>
-            </a:r>
-          </a:p>
-        </p:txBody>
-      </p:sp>
+          <a:ln>
+            <a:noFill/>
+          </a:ln>
+        </p:spPr>
+      </p:pic>
       <p:pic>
         <p:nvPicPr>
-          <p:cNvPr id="54" name="Picture 53"/>
-          <p:cNvPicPr>
-            <a:picLocks noChangeAspect="1"/>
-          </p:cNvPicPr>
+          <p:cNvPr id="45" name="Picture 44">
+            <a:extLst>
+              <a:ext uri="{FF2B5EF4-FFF2-40B4-BE49-F238E27FC236}">
+                <a16:creationId xmlns:a16="http://schemas.microsoft.com/office/drawing/2014/main" id="{4CA2AD2D-D287-4D31-8A64-679EBB6ECCDA}"/>
+              </a:ext>
+            </a:extLst>
+          </p:cNvPr>
+          <p:cNvPicPr/>
           <p:nvPr/>
         </p:nvPicPr>
-        <p:blipFill>
+        <p:blipFill rotWithShape="1">
           <a:blip r:embed="rId8">
             <a:extLst>
               <a:ext uri="{28A0092B-C50C-407E-A947-70E740481C1C}">
@@ -4498,72 +4208,139 @@
               </a:ext>
             </a:extLst>
           </a:blip>
+          <a:srcRect t="14228" b="10916"/>
+          <a:stretch/>
+        </p:blipFill>
+        <p:spPr bwMode="auto">
+          <a:xfrm>
+            <a:off x="42121527" y="7317710"/>
+            <a:ext cx="6770822" cy="5570905"/>
+          </a:xfrm>
+          <a:prstGeom prst="rect">
+            <a:avLst/>
+          </a:prstGeom>
+          <a:noFill/>
+          <a:ln>
+            <a:noFill/>
+          </a:ln>
+          <a:extLst>
+            <a:ext uri="{53640926-AAD7-44D8-BBD7-CCE9431645EC}">
+              <a14:shadowObscured xmlns:a14="http://schemas.microsoft.com/office/drawing/2010/main"/>
+            </a:ext>
+          </a:extLst>
+        </p:spPr>
+      </p:pic>
+      <p:pic>
+        <p:nvPicPr>
+          <p:cNvPr id="46" name="Picture 45">
+            <a:extLst>
+              <a:ext uri="{FF2B5EF4-FFF2-40B4-BE49-F238E27FC236}">
+                <a16:creationId xmlns:a16="http://schemas.microsoft.com/office/drawing/2014/main" id="{1276F1F7-1564-44DC-A6E4-D407AB1D3C80}"/>
+              </a:ext>
+            </a:extLst>
+          </p:cNvPr>
+          <p:cNvPicPr/>
+          <p:nvPr/>
+        </p:nvPicPr>
+        <p:blipFill>
+          <a:blip r:embed="rId9">
+            <a:extLst>
+              <a:ext uri="{28A0092B-C50C-407E-A947-70E740481C1C}">
+                <a14:useLocalDpi xmlns:a14="http://schemas.microsoft.com/office/drawing/2010/main" val="0"/>
+              </a:ext>
+            </a:extLst>
+          </a:blip>
+          <a:srcRect/>
           <a:stretch>
             <a:fillRect/>
           </a:stretch>
         </p:blipFill>
-        <p:spPr>
-          <a:xfrm>
-            <a:off x="35598138" y="26224890"/>
-            <a:ext cx="13494704" cy="3176769"/>
-          </a:xfrm>
-          <a:prstGeom prst="rect">
-            <a:avLst/>
-          </a:prstGeom>
-        </p:spPr>
-      </p:pic>
-      <p:sp>
-        <p:nvSpPr>
-          <p:cNvPr id="55" name="TextBox 54"/>
-          <p:cNvSpPr txBox="1"/>
-          <p:nvPr/>
-        </p:nvSpPr>
-        <p:spPr>
-          <a:xfrm>
-            <a:off x="38982645" y="25455449"/>
-            <a:ext cx="6426759" cy="769441"/>
+        <p:spPr bwMode="auto">
+          <a:xfrm>
+            <a:off x="34475633" y="13845667"/>
+            <a:ext cx="7255056" cy="5222347"/>
           </a:xfrm>
           <a:prstGeom prst="rect">
             <a:avLst/>
           </a:prstGeom>
           <a:noFill/>
-        </p:spPr>
-        <p:txBody>
-          <a:bodyPr wrap="none" rtlCol="0">
-            <a:spAutoFit/>
-          </a:bodyPr>
-          <a:lstStyle/>
-          <a:p>
-            <a:r>
-              <a:rPr lang="en-US" sz="4400" dirty="0">
-                <a:latin typeface="Arial" panose="020B0604020202020204" pitchFamily="34" charset="0"/>
-                <a:cs typeface="Arial" panose="020B0604020202020204" pitchFamily="34" charset="0"/>
-              </a:rPr>
-              <a:t>Occupant Risk Summary</a:t>
-            </a:r>
-          </a:p>
-        </p:txBody>
-      </p:sp>
+          <a:ln>
+            <a:noFill/>
+          </a:ln>
+        </p:spPr>
+      </p:pic>
       <p:pic>
         <p:nvPicPr>
-          <p:cNvPr id="58" name="Picture 57"/>
+          <p:cNvPr id="47" name="Picture 46">
+            <a:extLst>
+              <a:ext uri="{FF2B5EF4-FFF2-40B4-BE49-F238E27FC236}">
+                <a16:creationId xmlns:a16="http://schemas.microsoft.com/office/drawing/2014/main" id="{852833D1-9AA4-4C90-BA6E-5FBF98976C54}"/>
+              </a:ext>
+            </a:extLst>
+          </p:cNvPr>
           <p:cNvPicPr/>
           <p:nvPr/>
         </p:nvPicPr>
         <p:blipFill>
-          <a:blip r:embed="rId9"/>
+          <a:blip r:embed="rId10">
+            <a:extLst>
+              <a:ext uri="{28A0092B-C50C-407E-A947-70E740481C1C}">
+                <a14:useLocalDpi xmlns:a14="http://schemas.microsoft.com/office/drawing/2010/main" val="0"/>
+              </a:ext>
+            </a:extLst>
+          </a:blip>
+          <a:srcRect/>
           <a:stretch>
             <a:fillRect/>
           </a:stretch>
         </p:blipFill>
-        <p:spPr>
-          <a:xfrm>
-            <a:off x="31496514" y="12184933"/>
-            <a:ext cx="16719557" cy="11713138"/>
+        <p:spPr bwMode="auto">
+          <a:xfrm>
+            <a:off x="42146028" y="13576366"/>
+            <a:ext cx="6393051" cy="5311983"/>
           </a:xfrm>
           <a:prstGeom prst="rect">
             <a:avLst/>
           </a:prstGeom>
+          <a:noFill/>
+          <a:ln>
+            <a:noFill/>
+          </a:ln>
+        </p:spPr>
+      </p:pic>
+      <p:pic>
+        <p:nvPicPr>
+          <p:cNvPr id="50" name="Picture 49">
+            <a:extLst>
+              <a:ext uri="{FF2B5EF4-FFF2-40B4-BE49-F238E27FC236}">
+                <a16:creationId xmlns:a16="http://schemas.microsoft.com/office/drawing/2014/main" id="{EB58544B-067D-4850-87F0-52D17BF9B4CE}"/>
+              </a:ext>
+            </a:extLst>
+          </p:cNvPr>
+          <p:cNvPicPr/>
+          <p:nvPr/>
+        </p:nvPicPr>
+        <p:blipFill rotWithShape="1">
+          <a:blip r:embed="rId11"/>
+          <a:srcRect l="3012" r="4284"/>
+          <a:stretch/>
+        </p:blipFill>
+        <p:spPr bwMode="auto">
+          <a:xfrm>
+            <a:off x="891758" y="19151933"/>
+            <a:ext cx="12936704" cy="6259414"/>
+          </a:xfrm>
+          <a:prstGeom prst="rect">
+            <a:avLst/>
+          </a:prstGeom>
+          <a:ln>
+            <a:noFill/>
+          </a:ln>
+          <a:extLst>
+            <a:ext uri="{53640926-AAD7-44D8-BBD7-CCE9431645EC}">
+              <a14:shadowObscured xmlns:a14="http://schemas.microsoft.com/office/drawing/2010/main"/>
+            </a:ext>
+          </a:extLst>
         </p:spPr>
       </p:pic>
     </p:spTree>

</xml_diff>